<commit_message>
Adding some examples in python
</commit_message>
<xml_diff>
--- a/_essais/Others/Ateliers/Atelier1_MatlabVsPython.pptx
+++ b/_essais/Others/Ateliers/Atelier1_MatlabVsPython.pptx
@@ -243,7 +243,7 @@
           <a:p>
             <a:fld id="{1849BFA4-EEC1-43A9-882F-5774B0C281F5}" type="datetimeFigureOut">
               <a:rPr lang="fr-FR" smtClean="0"/>
-              <a:t>31/05/2022</a:t>
+              <a:t>11/04/2023</a:t>
             </a:fld>
             <a:endParaRPr lang="fr-FR"/>
           </a:p>
@@ -657,7 +657,7 @@
           <a:p>
             <a:fld id="{E4E34E35-1867-4A15-835E-9DA9F42E446E}" type="datetime1">
               <a:rPr lang="fr-FR" smtClean="0"/>
-              <a:t>31/05/2022</a:t>
+              <a:t>11/04/2023</a:t>
             </a:fld>
             <a:endParaRPr lang="fr-FR"/>
           </a:p>
@@ -855,7 +855,7 @@
           <a:p>
             <a:fld id="{CAB4A522-F2A4-4ADE-B0B4-4C45FD3D08F4}" type="datetime1">
               <a:rPr lang="fr-FR" smtClean="0"/>
-              <a:t>31/05/2022</a:t>
+              <a:t>11/04/2023</a:t>
             </a:fld>
             <a:endParaRPr lang="fr-FR"/>
           </a:p>
@@ -1063,7 +1063,7 @@
           <a:p>
             <a:fld id="{9820E3E7-EF15-4A53-A65F-AF89A0F04094}" type="datetime1">
               <a:rPr lang="fr-FR" smtClean="0"/>
-              <a:t>31/05/2022</a:t>
+              <a:t>11/04/2023</a:t>
             </a:fld>
             <a:endParaRPr lang="fr-FR"/>
           </a:p>
@@ -1261,7 +1261,7 @@
           <a:p>
             <a:fld id="{EDE49AEE-00F4-4D1C-B6B3-14F9656C375F}" type="datetime1">
               <a:rPr lang="fr-FR" smtClean="0"/>
-              <a:t>31/05/2022</a:t>
+              <a:t>11/04/2023</a:t>
             </a:fld>
             <a:endParaRPr lang="fr-FR"/>
           </a:p>
@@ -1536,7 +1536,7 @@
           <a:p>
             <a:fld id="{929BDA00-E6A3-4A62-9ADE-9C9AA6FA94C4}" type="datetime1">
               <a:rPr lang="fr-FR" smtClean="0"/>
-              <a:t>31/05/2022</a:t>
+              <a:t>11/04/2023</a:t>
             </a:fld>
             <a:endParaRPr lang="fr-FR"/>
           </a:p>
@@ -1801,7 +1801,7 @@
           <a:p>
             <a:fld id="{D12D6CC3-B542-40DC-9939-42177400A3CB}" type="datetime1">
               <a:rPr lang="fr-FR" smtClean="0"/>
-              <a:t>31/05/2022</a:t>
+              <a:t>11/04/2023</a:t>
             </a:fld>
             <a:endParaRPr lang="fr-FR"/>
           </a:p>
@@ -2213,7 +2213,7 @@
           <a:p>
             <a:fld id="{0AFEC442-3744-4D4E-B0CF-1AA097ED00A9}" type="datetime1">
               <a:rPr lang="fr-FR" smtClean="0"/>
-              <a:t>31/05/2022</a:t>
+              <a:t>11/04/2023</a:t>
             </a:fld>
             <a:endParaRPr lang="fr-FR"/>
           </a:p>
@@ -2354,7 +2354,7 @@
           <a:p>
             <a:fld id="{743FF790-C5FF-4944-BBC0-8D13C5A6EC97}" type="datetime1">
               <a:rPr lang="fr-FR" smtClean="0"/>
-              <a:t>31/05/2022</a:t>
+              <a:t>11/04/2023</a:t>
             </a:fld>
             <a:endParaRPr lang="fr-FR"/>
           </a:p>
@@ -2467,7 +2467,7 @@
           <a:p>
             <a:fld id="{91B9FF13-E62D-4C11-851E-31DE15F12C9D}" type="datetime1">
               <a:rPr lang="fr-FR" smtClean="0"/>
-              <a:t>31/05/2022</a:t>
+              <a:t>11/04/2023</a:t>
             </a:fld>
             <a:endParaRPr lang="fr-FR"/>
           </a:p>
@@ -2778,7 +2778,7 @@
           <a:p>
             <a:fld id="{DD9F9B0E-0C52-46DC-A97E-5656EB4130E8}" type="datetime1">
               <a:rPr lang="fr-FR" smtClean="0"/>
-              <a:t>31/05/2022</a:t>
+              <a:t>11/04/2023</a:t>
             </a:fld>
             <a:endParaRPr lang="fr-FR"/>
           </a:p>
@@ -3066,7 +3066,7 @@
           <a:p>
             <a:fld id="{51AC8951-C82A-463A-8AA1-EBE003899952}" type="datetime1">
               <a:rPr lang="fr-FR" smtClean="0"/>
-              <a:t>31/05/2022</a:t>
+              <a:t>11/04/2023</a:t>
             </a:fld>
             <a:endParaRPr lang="fr-FR"/>
           </a:p>
@@ -3307,7 +3307,7 @@
           <a:p>
             <a:fld id="{66614BD1-3660-4B93-BB37-3BEE147A6838}" type="datetime1">
               <a:rPr lang="fr-FR" smtClean="0"/>
-              <a:t>31/05/2022</a:t>
+              <a:t>11/04/2023</a:t>
             </a:fld>
             <a:endParaRPr lang="fr-FR"/>
           </a:p>

</xml_diff>